<commit_message>
minor update to OAuth presentation
</commit_message>
<xml_diff>
--- a/authentication/OAuth-Playground.pptx
+++ b/authentication/OAuth-Playground.pptx
@@ -21,6 +21,7 @@
     <p:sldId id="264" r:id="rId14"/>
     <p:sldId id="265" r:id="rId15"/>
     <p:sldId id="266" r:id="rId16"/>
+    <p:sldId id="267" r:id="rId17"/>
   </p:sldIdLst>
   <p:sldSz cx="9144000" cy="6858000"/>
   <p:notesSz cx="6858000" cy="9144000"/>
@@ -251,7 +252,7 @@
           </a:bodyPr>
           <a:p>
             <a:pPr algn="r"/>
-            <a:fld id="{3A16BB20-FF0D-4BEC-A496-3B8502950D80}" type="slidenum">
+            <a:fld id="{7BCDF13D-3C5D-40C7-BE77-E480B4F73943}" type="slidenum">
               <a:rPr b="0" lang="en-US" sz="1400" spc="-1" strike="noStrike">
                 <a:latin typeface="Times New Roman"/>
               </a:rPr>
@@ -288,7 +289,7 @@
       </p:grpSpPr>
       <p:sp>
         <p:nvSpPr>
-          <p:cNvPr id="156" name="PlaceHolder 1"/>
+          <p:cNvPr id="158" name="PlaceHolder 1"/>
           <p:cNvSpPr>
             <a:spLocks noGrp="1"/>
           </p:cNvSpPr>
@@ -299,23 +300,23 @@
         <p:spPr>
           <a:xfrm>
             <a:off x="1143000" y="685800"/>
-            <a:ext cx="4571640" cy="3428640"/>
-          </a:xfrm>
-          <a:prstGeom prst="rect">
-            <a:avLst/>
-          </a:prstGeom>
-        </p:spPr>
-      </p:sp>
-      <p:sp>
-        <p:nvSpPr>
-          <p:cNvPr id="157" name="CustomShape 2"/>
+            <a:ext cx="4571280" cy="3428280"/>
+          </a:xfrm>
+          <a:prstGeom prst="rect">
+            <a:avLst/>
+          </a:prstGeom>
+        </p:spPr>
+      </p:sp>
+      <p:sp>
+        <p:nvSpPr>
+          <p:cNvPr id="159" name="CustomShape 2"/>
           <p:cNvSpPr/>
           <p:nvPr/>
         </p:nvSpPr>
         <p:spPr>
           <a:xfrm>
             <a:off x="685800" y="4343400"/>
-            <a:ext cx="5486040" cy="4114440"/>
+            <a:ext cx="5485680" cy="4114080"/>
           </a:xfrm>
           <a:custGeom>
             <a:avLst/>
@@ -4461,9 +4462,9 @@
         <p:grpSpPr>
           <a:xfrm>
             <a:off x="0" y="2438280"/>
-            <a:ext cx="8991360" cy="1034640"/>
+            <a:ext cx="8991000" cy="1034280"/>
             <a:chOff x="0" y="2438280"/>
-            <a:chExt cx="8991360" cy="1034640"/>
+            <a:chExt cx="8991000" cy="1034280"/>
           </a:xfrm>
         </p:grpSpPr>
         <p:grpSp>
@@ -4475,9 +4476,9 @@
           <p:grpSpPr>
             <a:xfrm>
               <a:off x="290520" y="2546280"/>
-              <a:ext cx="693360" cy="456840"/>
+              <a:ext cx="693000" cy="456480"/>
               <a:chOff x="290520" y="2546280"/>
-              <a:chExt cx="693360" cy="456840"/>
+              <a:chExt cx="693000" cy="456480"/>
             </a:xfrm>
           </p:grpSpPr>
           <p:sp>
@@ -4489,7 +4490,7 @@
             <p:spPr>
               <a:xfrm>
                 <a:off x="290520" y="2546280"/>
-                <a:ext cx="420480" cy="456840"/>
+                <a:ext cx="420120" cy="456480"/>
               </a:xfrm>
               <a:prstGeom prst="rect">
                 <a:avLst/>
@@ -4517,7 +4518,7 @@
             <p:spPr>
               <a:xfrm>
                 <a:off x="673200" y="2546280"/>
-                <a:ext cx="310680" cy="456840"/>
+                <a:ext cx="310320" cy="456480"/>
               </a:xfrm>
               <a:prstGeom prst="rect">
                 <a:avLst/>
@@ -4554,9 +4555,9 @@
           <p:grpSpPr>
             <a:xfrm>
               <a:off x="414360" y="2968560"/>
-              <a:ext cx="720000" cy="456840"/>
+              <a:ext cx="719640" cy="456480"/>
               <a:chOff x="414360" y="2968560"/>
-              <a:chExt cx="720000" cy="456840"/>
+              <a:chExt cx="719640" cy="456480"/>
             </a:xfrm>
           </p:grpSpPr>
           <p:sp>
@@ -4568,7 +4569,7 @@
             <p:spPr>
               <a:xfrm>
                 <a:off x="414360" y="2968560"/>
-                <a:ext cx="421200" cy="456840"/>
+                <a:ext cx="420840" cy="456480"/>
               </a:xfrm>
               <a:prstGeom prst="rect">
                 <a:avLst/>
@@ -4596,7 +4597,7 @@
             <p:spPr>
               <a:xfrm>
                 <a:off x="783360" y="2968560"/>
-                <a:ext cx="351000" cy="456840"/>
+                <a:ext cx="350640" cy="456480"/>
               </a:xfrm>
               <a:prstGeom prst="rect">
                 <a:avLst/>
@@ -4633,7 +4634,7 @@
           <p:spPr>
             <a:xfrm>
               <a:off x="0" y="2895480"/>
-              <a:ext cx="542520" cy="404640"/>
+              <a:ext cx="542160" cy="404280"/>
             </a:xfrm>
             <a:prstGeom prst="rect">
               <a:avLst/>
@@ -4669,7 +4670,7 @@
           <p:spPr>
             <a:xfrm>
               <a:off x="635040" y="2438280"/>
-              <a:ext cx="14040" cy="1034640"/>
+              <a:ext cx="13680" cy="1034280"/>
             </a:xfrm>
             <a:prstGeom prst="rect">
               <a:avLst/>
@@ -4696,8 +4697,8 @@
           </p:nvSpPr>
           <p:spPr>
             <a:xfrm flipV="1">
-              <a:off x="316080" y="3255840"/>
-              <a:ext cx="8675280" cy="37440"/>
+              <a:off x="316080" y="3254760"/>
+              <a:ext cx="8674920" cy="37080"/>
             </a:xfrm>
             <a:prstGeom prst="rect">
               <a:avLst/>
@@ -4737,15 +4738,15 @@
         </p:nvSpPr>
         <p:spPr>
           <a:xfrm>
-            <a:off x="611280" y="259920"/>
-            <a:ext cx="7903800" cy="847440"/>
-          </a:xfrm>
-          <a:prstGeom prst="rect">
-            <a:avLst/>
-          </a:prstGeom>
-        </p:spPr>
-        <p:txBody>
-          <a:bodyPr lIns="90000" rIns="90000" tIns="46800" bIns="46800" anchor="b">
+            <a:off x="457200" y="273600"/>
+            <a:ext cx="8228880" cy="1144440"/>
+          </a:xfrm>
+          <a:prstGeom prst="rect">
+            <a:avLst/>
+          </a:prstGeom>
+        </p:spPr>
+        <p:txBody>
+          <a:bodyPr lIns="0" rIns="0" tIns="0" bIns="0" anchor="ctr">
             <a:noAutofit/>
           </a:bodyPr>
           <a:p>
@@ -4774,7 +4775,7 @@
         <p:spPr>
           <a:xfrm>
             <a:off x="457200" y="1604520"/>
-            <a:ext cx="8229240" cy="3977280"/>
+            <a:ext cx="8228880" cy="3976920"/>
           </a:xfrm>
           <a:prstGeom prst="rect">
             <a:avLst/>
@@ -4797,12 +4798,12 @@
               <a:buChar char=""/>
             </a:pPr>
             <a:r>
-              <a:rPr b="0" lang="en-US" sz="3200" spc="-1" strike="noStrike">
+              <a:rPr b="0" lang="en-US" sz="1800" spc="-1" strike="noStrike">
                 <a:latin typeface="Arial"/>
               </a:rPr>
               <a:t>Click to edit the outline text format</a:t>
             </a:r>
-            <a:endParaRPr b="0" lang="en-US" sz="3200" spc="-1" strike="noStrike">
+            <a:endParaRPr b="0" lang="en-US" sz="1800" spc="-1" strike="noStrike">
               <a:latin typeface="Arial"/>
             </a:endParaRPr>
           </a:p>
@@ -4819,12 +4820,12 @@
               <a:buChar char=""/>
             </a:pPr>
             <a:r>
-              <a:rPr b="0" lang="en-US" sz="2800" spc="-1" strike="noStrike">
+              <a:rPr b="0" lang="en-US" sz="1800" spc="-1" strike="noStrike">
                 <a:latin typeface="Arial"/>
               </a:rPr>
               <a:t>Second Outline Level</a:t>
             </a:r>
-            <a:endParaRPr b="0" lang="en-US" sz="2800" spc="-1" strike="noStrike">
+            <a:endParaRPr b="0" lang="en-US" sz="1800" spc="-1" strike="noStrike">
               <a:latin typeface="Arial"/>
             </a:endParaRPr>
           </a:p>
@@ -4841,12 +4842,12 @@
               <a:buChar char=""/>
             </a:pPr>
             <a:r>
-              <a:rPr b="0" lang="en-US" sz="2400" spc="-1" strike="noStrike">
+              <a:rPr b="0" lang="en-US" sz="1800" spc="-1" strike="noStrike">
                 <a:latin typeface="Arial"/>
               </a:rPr>
               <a:t>Third Outline Level</a:t>
             </a:r>
-            <a:endParaRPr b="0" lang="en-US" sz="2400" spc="-1" strike="noStrike">
+            <a:endParaRPr b="0" lang="en-US" sz="1800" spc="-1" strike="noStrike">
               <a:latin typeface="Arial"/>
             </a:endParaRPr>
           </a:p>
@@ -4863,12 +4864,12 @@
               <a:buChar char=""/>
             </a:pPr>
             <a:r>
-              <a:rPr b="0" lang="en-US" sz="2000" spc="-1" strike="noStrike">
+              <a:rPr b="0" lang="en-US" sz="1800" spc="-1" strike="noStrike">
                 <a:latin typeface="Arial"/>
               </a:rPr>
               <a:t>Fourth Outline Level</a:t>
             </a:r>
-            <a:endParaRPr b="0" lang="en-US" sz="2000" spc="-1" strike="noStrike">
+            <a:endParaRPr b="0" lang="en-US" sz="1800" spc="-1" strike="noStrike">
               <a:latin typeface="Arial"/>
             </a:endParaRPr>
           </a:p>
@@ -4885,12 +4886,12 @@
               <a:buChar char=""/>
             </a:pPr>
             <a:r>
-              <a:rPr b="0" lang="en-US" sz="2000" spc="-1" strike="noStrike">
+              <a:rPr b="0" lang="en-US" sz="1800" spc="-1" strike="noStrike">
                 <a:latin typeface="Arial"/>
               </a:rPr>
               <a:t>Fifth Outline Level</a:t>
             </a:r>
-            <a:endParaRPr b="0" lang="en-US" sz="2000" spc="-1" strike="noStrike">
+            <a:endParaRPr b="0" lang="en-US" sz="1800" spc="-1" strike="noStrike">
               <a:latin typeface="Arial"/>
             </a:endParaRPr>
           </a:p>
@@ -4907,12 +4908,12 @@
               <a:buChar char=""/>
             </a:pPr>
             <a:r>
-              <a:rPr b="0" lang="en-US" sz="2000" spc="-1" strike="noStrike">
+              <a:rPr b="0" lang="en-US" sz="1800" spc="-1" strike="noStrike">
                 <a:latin typeface="Arial"/>
               </a:rPr>
               <a:t>Sixth Outline Level</a:t>
             </a:r>
-            <a:endParaRPr b="0" lang="en-US" sz="2000" spc="-1" strike="noStrike">
+            <a:endParaRPr b="0" lang="en-US" sz="1800" spc="-1" strike="noStrike">
               <a:latin typeface="Arial"/>
             </a:endParaRPr>
           </a:p>
@@ -4929,12 +4930,12 @@
               <a:buChar char=""/>
             </a:pPr>
             <a:r>
-              <a:rPr b="0" lang="en-US" sz="2000" spc="-1" strike="noStrike">
+              <a:rPr b="0" lang="en-US" sz="1800" spc="-1" strike="noStrike">
                 <a:latin typeface="Arial"/>
               </a:rPr>
               <a:t>Seventh Outline Level</a:t>
             </a:r>
-            <a:endParaRPr b="0" lang="en-US" sz="2000" spc="-1" strike="noStrike">
+            <a:endParaRPr b="0" lang="en-US" sz="1800" spc="-1" strike="noStrike">
               <a:latin typeface="Arial"/>
             </a:endParaRPr>
           </a:p>
@@ -4993,9 +4994,9 @@
         <p:grpSpPr>
           <a:xfrm>
             <a:off x="189000" y="368280"/>
-            <a:ext cx="8208360" cy="1034640"/>
+            <a:ext cx="8208000" cy="1034280"/>
             <a:chOff x="189000" y="368280"/>
-            <a:chExt cx="8208360" cy="1034640"/>
+            <a:chExt cx="8208000" cy="1034280"/>
           </a:xfrm>
         </p:grpSpPr>
         <p:sp>
@@ -5007,7 +5008,7 @@
           <p:spPr>
             <a:xfrm>
               <a:off x="507960" y="368280"/>
-              <a:ext cx="14040" cy="1034640"/>
+              <a:ext cx="13680" cy="1034280"/>
             </a:xfrm>
             <a:prstGeom prst="rect">
               <a:avLst/>
@@ -5035,7 +5036,7 @@
           <p:spPr>
             <a:xfrm>
               <a:off x="189000" y="1158840"/>
-              <a:ext cx="8208360" cy="14040"/>
+              <a:ext cx="8208000" cy="13680"/>
             </a:xfrm>
             <a:prstGeom prst="rect">
               <a:avLst/>
@@ -5075,25 +5076,26 @@
         </p:nvSpPr>
         <p:spPr>
           <a:xfrm>
-            <a:off x="611280" y="259920"/>
-            <a:ext cx="7903800" cy="847440"/>
-          </a:xfrm>
-          <a:prstGeom prst="rect">
-            <a:avLst/>
-          </a:prstGeom>
-        </p:spPr>
-        <p:txBody>
-          <a:bodyPr lIns="90000" rIns="90000" tIns="46800" bIns="46800" anchor="b">
+            <a:off x="457200" y="273600"/>
+            <a:ext cx="8229240" cy="1144800"/>
+          </a:xfrm>
+          <a:prstGeom prst="rect">
+            <a:avLst/>
+          </a:prstGeom>
+        </p:spPr>
+        <p:txBody>
+          <a:bodyPr lIns="0" rIns="0" tIns="0" bIns="0" anchor="ctr">
             <a:noAutofit/>
           </a:bodyPr>
           <a:p>
+            <a:pPr algn="ctr"/>
             <a:r>
-              <a:rPr b="0" lang="en-US" sz="1800" spc="-1" strike="noStrike">
+              <a:rPr b="0" lang="en-US" sz="4400" spc="-1" strike="noStrike">
                 <a:latin typeface="Arial"/>
               </a:rPr>
               <a:t>Click to edit the title text format</a:t>
             </a:r>
-            <a:endParaRPr b="0" lang="en-US" sz="1800" spc="-1" strike="noStrike">
+            <a:endParaRPr b="0" lang="en-US" sz="4400" spc="-1" strike="noStrike">
               <a:latin typeface="Arial"/>
             </a:endParaRPr>
           </a:p>
@@ -5111,15 +5113,15 @@
         </p:nvSpPr>
         <p:spPr>
           <a:xfrm>
-            <a:off x="674640" y="1400040"/>
-            <a:ext cx="7903800" cy="4446360"/>
-          </a:xfrm>
-          <a:prstGeom prst="rect">
-            <a:avLst/>
-          </a:prstGeom>
-        </p:spPr>
-        <p:txBody>
-          <a:bodyPr lIns="90000" rIns="90000" tIns="46800" bIns="46800">
+            <a:off x="457200" y="1604520"/>
+            <a:ext cx="8229240" cy="3977280"/>
+          </a:xfrm>
+          <a:prstGeom prst="rect">
+            <a:avLst/>
+          </a:prstGeom>
+        </p:spPr>
+        <p:txBody>
+          <a:bodyPr lIns="0" rIns="0" tIns="0" bIns="0">
             <a:normAutofit/>
           </a:bodyPr>
           <a:p>
@@ -5135,12 +5137,12 @@
               <a:buChar char=""/>
             </a:pPr>
             <a:r>
-              <a:rPr b="0" lang="en-US" sz="1800" spc="-1" strike="noStrike">
+              <a:rPr b="0" lang="en-US" sz="3200" spc="-1" strike="noStrike">
                 <a:latin typeface="Arial"/>
               </a:rPr>
               <a:t>Click to edit the outline text format</a:t>
             </a:r>
-            <a:endParaRPr b="0" lang="en-US" sz="1800" spc="-1" strike="noStrike">
+            <a:endParaRPr b="0" lang="en-US" sz="3200" spc="-1" strike="noStrike">
               <a:latin typeface="Arial"/>
             </a:endParaRPr>
           </a:p>
@@ -5157,12 +5159,12 @@
               <a:buChar char=""/>
             </a:pPr>
             <a:r>
-              <a:rPr b="0" lang="en-US" sz="1800" spc="-1" strike="noStrike">
+              <a:rPr b="0" lang="en-US" sz="2800" spc="-1" strike="noStrike">
                 <a:latin typeface="Arial"/>
               </a:rPr>
               <a:t>Second Outline Level</a:t>
             </a:r>
-            <a:endParaRPr b="0" lang="en-US" sz="1800" spc="-1" strike="noStrike">
+            <a:endParaRPr b="0" lang="en-US" sz="2800" spc="-1" strike="noStrike">
               <a:latin typeface="Arial"/>
             </a:endParaRPr>
           </a:p>
@@ -5179,12 +5181,12 @@
               <a:buChar char=""/>
             </a:pPr>
             <a:r>
-              <a:rPr b="0" lang="en-US" sz="1800" spc="-1" strike="noStrike">
+              <a:rPr b="0" lang="en-US" sz="2400" spc="-1" strike="noStrike">
                 <a:latin typeface="Arial"/>
               </a:rPr>
               <a:t>Third Outline Level</a:t>
             </a:r>
-            <a:endParaRPr b="0" lang="en-US" sz="1800" spc="-1" strike="noStrike">
+            <a:endParaRPr b="0" lang="en-US" sz="2400" spc="-1" strike="noStrike">
               <a:latin typeface="Arial"/>
             </a:endParaRPr>
           </a:p>
@@ -5201,12 +5203,12 @@
               <a:buChar char=""/>
             </a:pPr>
             <a:r>
-              <a:rPr b="0" lang="en-US" sz="1800" spc="-1" strike="noStrike">
+              <a:rPr b="0" lang="en-US" sz="2000" spc="-1" strike="noStrike">
                 <a:latin typeface="Arial"/>
               </a:rPr>
               <a:t>Fourth Outline Level</a:t>
             </a:r>
-            <a:endParaRPr b="0" lang="en-US" sz="1800" spc="-1" strike="noStrike">
+            <a:endParaRPr b="0" lang="en-US" sz="2000" spc="-1" strike="noStrike">
               <a:latin typeface="Arial"/>
             </a:endParaRPr>
           </a:p>
@@ -5223,12 +5225,12 @@
               <a:buChar char=""/>
             </a:pPr>
             <a:r>
-              <a:rPr b="0" lang="en-US" sz="1800" spc="-1" strike="noStrike">
+              <a:rPr b="0" lang="en-US" sz="2000" spc="-1" strike="noStrike">
                 <a:latin typeface="Arial"/>
               </a:rPr>
               <a:t>Fifth Outline Level</a:t>
             </a:r>
-            <a:endParaRPr b="0" lang="en-US" sz="1800" spc="-1" strike="noStrike">
+            <a:endParaRPr b="0" lang="en-US" sz="2000" spc="-1" strike="noStrike">
               <a:latin typeface="Arial"/>
             </a:endParaRPr>
           </a:p>
@@ -5245,12 +5247,12 @@
               <a:buChar char=""/>
             </a:pPr>
             <a:r>
-              <a:rPr b="0" lang="en-US" sz="1800" spc="-1" strike="noStrike">
+              <a:rPr b="0" lang="en-US" sz="2000" spc="-1" strike="noStrike">
                 <a:latin typeface="Arial"/>
               </a:rPr>
               <a:t>Sixth Outline Level</a:t>
             </a:r>
-            <a:endParaRPr b="0" lang="en-US" sz="1800" spc="-1" strike="noStrike">
+            <a:endParaRPr b="0" lang="en-US" sz="2000" spc="-1" strike="noStrike">
               <a:latin typeface="Arial"/>
             </a:endParaRPr>
           </a:p>
@@ -5267,12 +5269,12 @@
               <a:buChar char=""/>
             </a:pPr>
             <a:r>
-              <a:rPr b="0" lang="en-US" sz="1800" spc="-1" strike="noStrike">
+              <a:rPr b="0" lang="en-US" sz="2000" spc="-1" strike="noStrike">
                 <a:latin typeface="Arial"/>
               </a:rPr>
               <a:t>Seventh Outline Level</a:t>
             </a:r>
-            <a:endParaRPr b="0" lang="en-US" sz="1800" spc="-1" strike="noStrike">
+            <a:endParaRPr b="0" lang="en-US" sz="2000" spc="-1" strike="noStrike">
               <a:latin typeface="Arial"/>
             </a:endParaRPr>
           </a:p>
@@ -5331,9 +5333,9 @@
         <p:grpSpPr>
           <a:xfrm>
             <a:off x="189000" y="368280"/>
-            <a:ext cx="8208360" cy="1034640"/>
+            <a:ext cx="8208000" cy="1034280"/>
             <a:chOff x="189000" y="368280"/>
-            <a:chExt cx="8208360" cy="1034640"/>
+            <a:chExt cx="8208000" cy="1034280"/>
           </a:xfrm>
         </p:grpSpPr>
         <p:sp>
@@ -5345,7 +5347,7 @@
           <p:spPr>
             <a:xfrm>
               <a:off x="507960" y="368280"/>
-              <a:ext cx="14040" cy="1034640"/>
+              <a:ext cx="13680" cy="1034280"/>
             </a:xfrm>
             <a:prstGeom prst="rect">
               <a:avLst/>
@@ -5373,7 +5375,7 @@
           <p:spPr>
             <a:xfrm>
               <a:off x="189000" y="1158840"/>
-              <a:ext cx="8208360" cy="14040"/>
+              <a:ext cx="8208000" cy="13680"/>
             </a:xfrm>
             <a:prstGeom prst="rect">
               <a:avLst/>
@@ -5670,7 +5672,7 @@
         <p:spPr>
           <a:xfrm>
             <a:off x="914400" y="1676160"/>
-            <a:ext cx="7314840" cy="1461600"/>
+            <a:ext cx="7314480" cy="1461240"/>
           </a:xfrm>
           <a:prstGeom prst="rect">
             <a:avLst/>
@@ -5725,6 +5727,7 @@
                   <a:srgbClr val="333399"/>
                 </a:solidFill>
                 <a:latin typeface="Arial"/>
+                <a:ea typeface="DejaVu Sans"/>
               </a:rPr>
               <a:t>OAuth Practice</a:t>
             </a:r>
@@ -5743,7 +5746,7 @@
         <p:spPr>
           <a:xfrm>
             <a:off x="1371600" y="3886200"/>
-            <a:ext cx="6400440" cy="1752120"/>
+            <a:ext cx="6400080" cy="1751760"/>
           </a:xfrm>
           <a:prstGeom prst="rect">
             <a:avLst/>
@@ -5764,7 +5767,7 @@
             <a:noAutofit/>
           </a:bodyPr>
           <a:p>
-            <a:pPr marL="342720" indent="-342360" algn="ctr">
+            <a:pPr marL="342720" indent="-342000" algn="ctr">
               <a:lnSpc>
                 <a:spcPct val="100000"/>
               </a:lnSpc>
@@ -5781,6 +5784,7 @@
                   <a:srgbClr val="000000"/>
                 </a:solidFill>
                 <a:latin typeface="Arial"/>
+                <a:ea typeface="DejaVu Sans"/>
               </a:rPr>
               <a:t>OAuth Playgrounds</a:t>
             </a:r>
@@ -5839,8 +5843,31 @@
         </p:blipFill>
         <p:spPr>
           <a:xfrm>
-            <a:off x="171360" y="606600"/>
-            <a:ext cx="8827920" cy="5154120"/>
+            <a:off x="274680" y="457200"/>
+            <a:ext cx="8295480" cy="1637640"/>
+          </a:xfrm>
+          <a:prstGeom prst="rect">
+            <a:avLst/>
+          </a:prstGeom>
+          <a:ln>
+            <a:noFill/>
+          </a:ln>
+        </p:spPr>
+      </p:pic>
+      <p:pic>
+        <p:nvPicPr>
+          <p:cNvPr id="155" name="" descr=""/>
+          <p:cNvPicPr/>
+          <p:nvPr/>
+        </p:nvPicPr>
+        <p:blipFill>
+          <a:blip r:embed="rId2"/>
+          <a:stretch/>
+        </p:blipFill>
+        <p:spPr>
+          <a:xfrm>
+            <a:off x="182520" y="2109960"/>
+            <a:ext cx="8581320" cy="4656960"/>
           </a:xfrm>
           <a:prstGeom prst="rect">
             <a:avLst/>
@@ -5889,7 +5916,7 @@
       </p:grpSpPr>
       <p:pic>
         <p:nvPicPr>
-          <p:cNvPr id="155" name="" descr=""/>
+          <p:cNvPr id="156" name="" descr=""/>
           <p:cNvPicPr/>
           <p:nvPr/>
         </p:nvPicPr>
@@ -5899,8 +5926,68 @@
         </p:blipFill>
         <p:spPr>
           <a:xfrm>
+            <a:off x="171360" y="606600"/>
+            <a:ext cx="8827560" cy="5153760"/>
+          </a:xfrm>
+          <a:prstGeom prst="rect">
+            <a:avLst/>
+          </a:prstGeom>
+          <a:ln>
+            <a:noFill/>
+          </a:ln>
+        </p:spPr>
+      </p:pic>
+    </p:spTree>
+  </p:cSld>
+  <mc:AlternateContent>
+    <mc:Choice Requires="p14">
+      <p:transition spd="slow" p14:dur="2000"/>
+    </mc:Choice>
+    <mc:Fallback>
+      <p:transition spd="slow"/>
+    </mc:Fallback>
+  </mc:AlternateContent>
+</p:sld>
+</file>
+
+<file path=ppt/slides/slide12.xml><?xml version="1.0" encoding="utf-8"?>
+<p:sld xmlns:a="http://schemas.openxmlformats.org/drawingml/2006/main" xmlns:p="http://schemas.openxmlformats.org/presentationml/2006/main" xmlns:r="http://schemas.openxmlformats.org/officeDocument/2006/relationships" xmlns:p14="http://schemas.microsoft.com/office/powerpoint/2010/main" xmlns:p15="http://schemas.microsoft.com/office/powerpoint/2012/main" xmlns:mc="http://schemas.openxmlformats.org/markup-compatibility/2006">
+  <p:cSld>
+    <p:bg>
+      <p:bgPr>
+        <a:solidFill>
+          <a:srgbClr val="ffffff"/>
+        </a:solidFill>
+      </p:bgPr>
+    </p:bg>
+    <p:spTree>
+      <p:nvGrpSpPr>
+        <p:cNvPr id="1" name=""/>
+        <p:cNvGrpSpPr/>
+        <p:nvPr/>
+      </p:nvGrpSpPr>
+      <p:grpSpPr>
+        <a:xfrm>
+          <a:off x="0" y="0"/>
+          <a:ext cx="0" cy="0"/>
+          <a:chOff x="0" y="0"/>
+          <a:chExt cx="0" cy="0"/>
+        </a:xfrm>
+      </p:grpSpPr>
+      <p:pic>
+        <p:nvPicPr>
+          <p:cNvPr id="157" name="" descr=""/>
+          <p:cNvPicPr/>
+          <p:nvPr/>
+        </p:nvPicPr>
+        <p:blipFill>
+          <a:blip r:embed="rId1"/>
+          <a:stretch/>
+        </p:blipFill>
+        <p:spPr>
+          <a:xfrm>
             <a:off x="31680" y="1189080"/>
-            <a:ext cx="9267480" cy="4571640"/>
+            <a:ext cx="9267120" cy="4571280"/>
           </a:xfrm>
           <a:prstGeom prst="rect">
             <a:avLst/>
@@ -5956,7 +6043,7 @@
         <p:spPr>
           <a:xfrm>
             <a:off x="456840" y="274320"/>
-            <a:ext cx="8211600" cy="850320"/>
+            <a:ext cx="8211240" cy="849960"/>
           </a:xfrm>
           <a:prstGeom prst="rect">
             <a:avLst/>
@@ -6023,6 +6110,7 @@
                   <a:srgbClr val="333399"/>
                 </a:solidFill>
                 <a:latin typeface="Arial"/>
+                <a:ea typeface="DejaVu Sans"/>
               </a:rPr>
               <a:t>Exercise: OAuth 2.0 Playground</a:t>
             </a:r>
@@ -6041,7 +6129,7 @@
         <p:spPr>
           <a:xfrm>
             <a:off x="365040" y="1125360"/>
-            <a:ext cx="8211960" cy="4935240"/>
+            <a:ext cx="8211600" cy="4934880"/>
           </a:xfrm>
           <a:prstGeom prst="rect">
             <a:avLst/>
@@ -6062,7 +6150,7 @@
             <a:normAutofit/>
           </a:bodyPr>
           <a:p>
-            <a:pPr marL="342720" indent="-334440" algn="ctr">
+            <a:pPr marL="342720" indent="-334080" algn="ctr">
               <a:lnSpc>
                 <a:spcPct val="100000"/>
               </a:lnSpc>
@@ -6079,6 +6167,7 @@
                   <a:srgbClr val="000000"/>
                 </a:solidFill>
                 <a:latin typeface="Courier New"/>
+                <a:ea typeface="DejaVu Sans"/>
               </a:rPr>
               <a:t>https://www.oauth.com/playground/</a:t>
             </a:r>
@@ -6087,7 +6176,7 @@
             </a:endParaRPr>
           </a:p>
           <a:p>
-            <a:pPr marL="342720" indent="-334440">
+            <a:pPr marL="342720" indent="-334080">
               <a:lnSpc>
                 <a:spcPct val="100000"/>
               </a:lnSpc>
@@ -6117,7 +6206,7 @@
         <p:spPr>
           <a:xfrm>
             <a:off x="2193840" y="1704960"/>
-            <a:ext cx="4663800" cy="3051000"/>
+            <a:ext cx="4663440" cy="3050640"/>
           </a:xfrm>
           <a:prstGeom prst="rect">
             <a:avLst/>
@@ -6140,7 +6229,7 @@
         <p:spPr>
           <a:xfrm>
             <a:off x="1908000" y="4664160"/>
-            <a:ext cx="5316480" cy="1825200"/>
+            <a:ext cx="5316120" cy="1824840"/>
           </a:xfrm>
           <a:prstGeom prst="rect">
             <a:avLst/>
@@ -6159,7 +6248,7 @@
         <p:spPr>
           <a:xfrm>
             <a:off x="1463760" y="5303880"/>
-            <a:ext cx="2650680" cy="821880"/>
+            <a:ext cx="2650320" cy="821520"/>
           </a:xfrm>
           <a:prstGeom prst="ellipse">
             <a:avLst/>
@@ -6188,7 +6277,7 @@
         <p:spPr>
           <a:xfrm>
             <a:off x="0" y="4299120"/>
-            <a:ext cx="2010960" cy="1094760"/>
+            <a:ext cx="2010600" cy="1094400"/>
           </a:xfrm>
           <a:custGeom>
             <a:avLst/>
@@ -6353,7 +6442,7 @@
         <p:spPr>
           <a:xfrm>
             <a:off x="456840" y="274320"/>
-            <a:ext cx="8211600" cy="850320"/>
+            <a:ext cx="8211240" cy="849960"/>
           </a:xfrm>
           <a:prstGeom prst="rect">
             <a:avLst/>
@@ -6420,6 +6509,7 @@
                   <a:srgbClr val="333399"/>
                 </a:solidFill>
                 <a:latin typeface="Arial"/>
+                <a:ea typeface="DejaVu Sans"/>
               </a:rPr>
               <a:t>Exercise: OAuth 2.0 Playground</a:t>
             </a:r>
@@ -6438,7 +6528,7 @@
         <p:spPr>
           <a:xfrm>
             <a:off x="456840" y="1371600"/>
-            <a:ext cx="8211600" cy="4935240"/>
+            <a:ext cx="8211240" cy="4934880"/>
           </a:xfrm>
           <a:prstGeom prst="rect">
             <a:avLst/>
@@ -6459,7 +6549,7 @@
             <a:normAutofit/>
           </a:bodyPr>
           <a:p>
-            <a:pPr marL="342720" indent="-334440" algn="ctr">
+            <a:pPr marL="342720" indent="-334080" algn="ctr">
               <a:lnSpc>
                 <a:spcPct val="100000"/>
               </a:lnSpc>
@@ -6476,6 +6566,7 @@
                   <a:srgbClr val="000000"/>
                 </a:solidFill>
                 <a:latin typeface="Arial"/>
+                <a:ea typeface="DejaVu Sans"/>
               </a:rPr>
               <a:t>Choose "</a:t>
             </a:r>
@@ -6485,6 +6576,7 @@
                   <a:srgbClr val="000080"/>
                 </a:solidFill>
                 <a:latin typeface="Arial"/>
+                <a:ea typeface="DejaVu Sans"/>
               </a:rPr>
               <a:t>Authorization Code</a:t>
             </a:r>
@@ -6494,6 +6586,7 @@
                   <a:srgbClr val="000000"/>
                 </a:solidFill>
                 <a:latin typeface="Arial"/>
+                <a:ea typeface="DejaVu Sans"/>
               </a:rPr>
               <a:t>" flow.</a:t>
             </a:r>
@@ -6502,7 +6595,7 @@
             </a:endParaRPr>
           </a:p>
           <a:p>
-            <a:pPr marL="342720" indent="-334440">
+            <a:pPr marL="342720" indent="-334080">
               <a:lnSpc>
                 <a:spcPct val="100000"/>
               </a:lnSpc>
@@ -6518,7 +6611,7 @@
             </a:endParaRPr>
           </a:p>
           <a:p>
-            <a:pPr marL="342720" indent="-334440" algn="ctr">
+            <a:pPr marL="342720" indent="-334080" algn="ctr">
               <a:lnSpc>
                 <a:spcPct val="100000"/>
               </a:lnSpc>
@@ -6535,6 +6628,7 @@
                   <a:srgbClr val="000080"/>
                 </a:solidFill>
                 <a:latin typeface="Arial"/>
+                <a:ea typeface="DejaVu Sans"/>
               </a:rPr>
               <a:t>Work through the exercise.</a:t>
             </a:r>
@@ -6543,7 +6637,7 @@
             </a:endParaRPr>
           </a:p>
           <a:p>
-            <a:pPr marL="342720" indent="-334440">
+            <a:pPr marL="342720" indent="-334080">
               <a:lnSpc>
                 <a:spcPct val="100000"/>
               </a:lnSpc>
@@ -6559,7 +6653,7 @@
             </a:endParaRPr>
           </a:p>
           <a:p>
-            <a:pPr marL="342720" indent="-334440" algn="ctr">
+            <a:pPr marL="342720" indent="-334080" algn="ctr">
               <a:lnSpc>
                 <a:spcPct val="100000"/>
               </a:lnSpc>
@@ -6576,6 +6670,7 @@
                   <a:srgbClr val="ff0000"/>
                 </a:solidFill>
                 <a:latin typeface="Arial"/>
+                <a:ea typeface="DejaVu Sans"/>
               </a:rPr>
               <a:t>Note</a:t>
             </a:r>
@@ -6585,6 +6680,7 @@
                   <a:srgbClr val="000080"/>
                 </a:solidFill>
                 <a:latin typeface="Arial"/>
+                <a:ea typeface="DejaVu Sans"/>
               </a:rPr>
               <a:t>: </a:t>
             </a:r>
@@ -6593,7 +6689,7 @@
             </a:endParaRPr>
           </a:p>
           <a:p>
-            <a:pPr marL="342720" indent="-334440">
+            <a:pPr marL="342720" indent="-334080">
               <a:lnSpc>
                 <a:spcPct val="100000"/>
               </a:lnSpc>
@@ -6610,6 +6706,7 @@
                   <a:srgbClr val="000080"/>
                 </a:solidFill>
                 <a:latin typeface="Arial"/>
+                <a:ea typeface="DejaVu Sans"/>
               </a:rPr>
               <a:t>   </a:t>
             </a:r>
@@ -6619,8 +6716,91 @@
                   <a:srgbClr val="000080"/>
                 </a:solidFill>
                 <a:latin typeface="Arial"/>
+                <a:ea typeface="DejaVu Sans"/>
               </a:rPr>
-              <a:t>you need to remember (or write down) the username and password the site gives.</a:t>
+              <a:t>you need to save the User </a:t>
+            </a:r>
+            <a:r>
+              <a:rPr b="0" lang="en-US" sz="2800" spc="-1" strike="noStrike">
+                <a:solidFill>
+                  <a:srgbClr val="ff0000"/>
+                </a:solidFill>
+                <a:latin typeface="Arial"/>
+                <a:ea typeface="DejaVu Sans"/>
+              </a:rPr>
+              <a:t>login</a:t>
+            </a:r>
+            <a:r>
+              <a:rPr b="0" lang="en-US" sz="2800" spc="-1" strike="noStrike">
+                <a:solidFill>
+                  <a:srgbClr val="000080"/>
+                </a:solidFill>
+                <a:latin typeface="Arial"/>
+                <a:ea typeface="DejaVu Sans"/>
+              </a:rPr>
+              <a:t> and </a:t>
+            </a:r>
+            <a:r>
+              <a:rPr b="0" lang="en-US" sz="2800" spc="-1" strike="noStrike">
+                <a:solidFill>
+                  <a:srgbClr val="ff0000"/>
+                </a:solidFill>
+                <a:latin typeface="Arial"/>
+                <a:ea typeface="DejaVu Sans"/>
+              </a:rPr>
+              <a:t>password</a:t>
+            </a:r>
+            <a:r>
+              <a:rPr b="0" lang="en-US" sz="2800" spc="-1" strike="noStrike">
+                <a:solidFill>
+                  <a:srgbClr val="000080"/>
+                </a:solidFill>
+                <a:latin typeface="Arial"/>
+                <a:ea typeface="DejaVu Sans"/>
+              </a:rPr>
+              <a:t> the site gives. Click "open in new window" to preserve it.</a:t>
+            </a:r>
+            <a:endParaRPr b="0" lang="en-US" sz="2800" spc="-1" strike="noStrike">
+              <a:latin typeface="Arial"/>
+            </a:endParaRPr>
+          </a:p>
+          <a:p>
+            <a:pPr marL="342720" indent="-334080">
+              <a:lnSpc>
+                <a:spcPct val="100000"/>
+              </a:lnSpc>
+              <a:spcBef>
+                <a:spcPts val="598"/>
+              </a:spcBef>
+              <a:tabLst>
+                <a:tab algn="l" pos="0"/>
+              </a:tabLst>
+            </a:pPr>
+            <a:endParaRPr b="0" lang="en-US" sz="2800" spc="-1" strike="noStrike">
+              <a:latin typeface="Arial"/>
+            </a:endParaRPr>
+          </a:p>
+          <a:p>
+            <a:pPr marL="342720" indent="-334080" algn="ctr">
+              <a:lnSpc>
+                <a:spcPct val="100000"/>
+              </a:lnSpc>
+              <a:spcBef>
+                <a:spcPts val="598"/>
+              </a:spcBef>
+              <a:tabLst>
+                <a:tab algn="l" pos="0"/>
+              </a:tabLst>
+            </a:pPr>
+            <a:r>
+              <a:rPr b="0" lang="en-US" sz="2800" spc="-1" strike="noStrike">
+                <a:solidFill>
+                  <a:srgbClr val="ff0000"/>
+                </a:solidFill>
+                <a:latin typeface="Arial"/>
+                <a:ea typeface="DejaVu Sans"/>
+              </a:rPr>
+              <a:t>Next Slide for Important Terms</a:t>
             </a:r>
             <a:endParaRPr b="0" lang="en-US" sz="2800" spc="-1" strike="noStrike">
               <a:latin typeface="Arial"/>
@@ -6644,13 +6824,6 @@
 <file path=ppt/slides/slide4.xml><?xml version="1.0" encoding="utf-8"?>
 <p:sld xmlns:a="http://schemas.openxmlformats.org/drawingml/2006/main" xmlns:p="http://schemas.openxmlformats.org/presentationml/2006/main" xmlns:r="http://schemas.openxmlformats.org/officeDocument/2006/relationships" xmlns:p14="http://schemas.microsoft.com/office/powerpoint/2010/main" xmlns:p15="http://schemas.microsoft.com/office/powerpoint/2012/main" xmlns:mc="http://schemas.openxmlformats.org/markup-compatibility/2006">
   <p:cSld>
-    <p:bg>
-      <p:bgPr>
-        <a:solidFill>
-          <a:srgbClr val="ffffff"/>
-        </a:solidFill>
-      </p:bgPr>
-    </p:bg>
     <p:spTree>
       <p:nvGrpSpPr>
         <p:cNvPr id="1" name=""/>
@@ -6665,29 +6838,232 @@
           <a:chExt cx="0" cy="0"/>
         </a:xfrm>
       </p:grpSpPr>
-      <p:pic>
-        <p:nvPicPr>
-          <p:cNvPr id="146" name="" descr=""/>
-          <p:cNvPicPr/>
+      <p:sp>
+        <p:nvSpPr>
+          <p:cNvPr id="146" name="CustomShape 1"/>
+          <p:cNvSpPr/>
           <p:nvPr/>
-        </p:nvPicPr>
-        <p:blipFill>
-          <a:blip r:embed="rId1"/>
-          <a:stretch/>
-        </p:blipFill>
-        <p:spPr>
-          <a:xfrm>
-            <a:off x="938160" y="92160"/>
-            <a:ext cx="6757560" cy="6165360"/>
-          </a:xfrm>
-          <a:prstGeom prst="rect">
-            <a:avLst/>
-          </a:prstGeom>
+        </p:nvSpPr>
+        <p:spPr>
+          <a:xfrm>
+            <a:off x="456840" y="274320"/>
+            <a:ext cx="8211240" cy="849960"/>
+          </a:xfrm>
+          <a:prstGeom prst="rect">
+            <a:avLst/>
+          </a:prstGeom>
+          <a:noFill/>
           <a:ln>
             <a:noFill/>
           </a:ln>
         </p:spPr>
-      </p:pic>
+        <p:style>
+          <a:lnRef idx="0"/>
+          <a:fillRef idx="0"/>
+          <a:effectRef idx="0"/>
+          <a:fontRef idx="minor"/>
+        </p:style>
+        <p:txBody>
+          <a:bodyPr lIns="90000" rIns="90000" tIns="46800" bIns="46800" anchor="ctr">
+            <a:noAutofit/>
+          </a:bodyPr>
+          <a:p>
+            <a:pPr algn="ctr">
+              <a:lnSpc>
+                <a:spcPct val="100000"/>
+              </a:lnSpc>
+              <a:tabLst>
+                <a:tab algn="l" pos="0"/>
+                <a:tab algn="l" pos="355320"/>
+                <a:tab algn="l" pos="714240"/>
+                <a:tab algn="l" pos="1072800"/>
+                <a:tab algn="l" pos="1431720"/>
+                <a:tab algn="l" pos="1790640"/>
+                <a:tab algn="l" pos="2149200"/>
+                <a:tab algn="l" pos="2508120"/>
+                <a:tab algn="l" pos="2866680"/>
+                <a:tab algn="l" pos="3225600"/>
+                <a:tab algn="l" pos="3584520"/>
+                <a:tab algn="l" pos="3943080"/>
+                <a:tab algn="l" pos="4302000"/>
+                <a:tab algn="l" pos="4660560"/>
+                <a:tab algn="l" pos="5019480"/>
+                <a:tab algn="l" pos="5378400"/>
+                <a:tab algn="l" pos="5736960"/>
+                <a:tab algn="l" pos="6095880"/>
+                <a:tab algn="l" pos="6454440"/>
+                <a:tab algn="l" pos="6813360"/>
+                <a:tab algn="l" pos="7172280"/>
+                <a:tab algn="l" pos="7205400"/>
+                <a:tab algn="l" pos="7565760"/>
+                <a:tab algn="l" pos="7926120"/>
+                <a:tab algn="l" pos="8250120"/>
+                <a:tab algn="l" pos="8608680"/>
+                <a:tab algn="l" pos="8967600"/>
+                <a:tab algn="l" pos="9326520"/>
+                <a:tab algn="l" pos="9685080"/>
+                <a:tab algn="l" pos="10044000"/>
+                <a:tab algn="l" pos="10402560"/>
+                <a:tab algn="l" pos="10761480"/>
+                <a:tab algn="l" pos="10762920"/>
+              </a:tabLst>
+            </a:pPr>
+            <a:r>
+              <a:rPr b="0" lang="en-US" sz="3600" spc="-1" strike="noStrike">
+                <a:solidFill>
+                  <a:srgbClr val="333399"/>
+                </a:solidFill>
+                <a:latin typeface="Arial"/>
+                <a:ea typeface="DejaVu Sans"/>
+              </a:rPr>
+              <a:t>OAuth Terms</a:t>
+            </a:r>
+            <a:endParaRPr b="0" lang="en-US" sz="3600" spc="-1" strike="noStrike">
+              <a:latin typeface="Arial"/>
+            </a:endParaRPr>
+          </a:p>
+        </p:txBody>
+      </p:sp>
+      <p:sp>
+        <p:nvSpPr>
+          <p:cNvPr id="147" name="TextShape 2"/>
+          <p:cNvSpPr txBox="1"/>
+          <p:nvPr/>
+        </p:nvSpPr>
+        <p:spPr>
+          <a:xfrm>
+            <a:off x="548640" y="1371600"/>
+            <a:ext cx="8046720" cy="5486400"/>
+          </a:xfrm>
+          <a:prstGeom prst="rect">
+            <a:avLst/>
+          </a:prstGeom>
+          <a:noFill/>
+          <a:ln>
+            <a:noFill/>
+          </a:ln>
+        </p:spPr>
+        <p:txBody>
+          <a:bodyPr lIns="90000" rIns="90000" tIns="45000" bIns="45000">
+            <a:noAutofit/>
+          </a:bodyPr>
+          <a:p>
+            <a:r>
+              <a:rPr b="0" lang="en-US" sz="2400" spc="-1" strike="noStrike">
+                <a:solidFill>
+                  <a:srgbClr val="000080"/>
+                </a:solidFill>
+                <a:latin typeface="Arial"/>
+              </a:rPr>
+              <a:t>Client</a:t>
+            </a:r>
+            <a:r>
+              <a:rPr b="0" lang="en-US" sz="2400" spc="-1" strike="noStrike">
+                <a:latin typeface="Arial"/>
+              </a:rPr>
+              <a:t> - application that wants access to a "user's" resource(s).</a:t>
+            </a:r>
+            <a:endParaRPr b="0" lang="en-US" sz="2400" spc="-1" strike="noStrike">
+              <a:latin typeface="Arial"/>
+            </a:endParaRPr>
+          </a:p>
+          <a:p>
+            <a:r>
+              <a:rPr b="0" lang="en-US" sz="2400" spc="-1" strike="noStrike">
+                <a:solidFill>
+                  <a:srgbClr val="000080"/>
+                </a:solidFill>
+                <a:latin typeface="Arial"/>
+              </a:rPr>
+              <a:t>Authorization Server</a:t>
+            </a:r>
+            <a:r>
+              <a:rPr b="0" lang="en-US" sz="2400" spc="-1" strike="noStrike">
+                <a:latin typeface="Arial"/>
+              </a:rPr>
+              <a:t> - host or app on Resource Server that handle authentication. This is where you register a Client application.</a:t>
+            </a:r>
+            <a:endParaRPr b="0" lang="en-US" sz="2400" spc="-1" strike="noStrike">
+              <a:latin typeface="Arial"/>
+            </a:endParaRPr>
+          </a:p>
+          <a:p>
+            <a:r>
+              <a:rPr b="0" lang="en-US" sz="2400" spc="-1" strike="noStrike">
+                <a:solidFill>
+                  <a:srgbClr val="000080"/>
+                </a:solidFill>
+                <a:latin typeface="Arial"/>
+              </a:rPr>
+              <a:t>User</a:t>
+            </a:r>
+            <a:r>
+              <a:rPr b="0" lang="en-US" sz="2400" spc="-1" strike="noStrike">
+                <a:latin typeface="Arial"/>
+              </a:rPr>
+              <a:t> - any end user of the Client application.</a:t>
+            </a:r>
+            <a:endParaRPr b="0" lang="en-US" sz="2400" spc="-1" strike="noStrike">
+              <a:latin typeface="Arial"/>
+            </a:endParaRPr>
+          </a:p>
+          <a:p>
+            <a:r>
+              <a:rPr b="0" lang="en-US" sz="2400" spc="-1" strike="noStrike">
+                <a:solidFill>
+                  <a:srgbClr val="000080"/>
+                </a:solidFill>
+                <a:latin typeface="Arial"/>
+              </a:rPr>
+              <a:t>Redirect URL</a:t>
+            </a:r>
+            <a:r>
+              <a:rPr b="0" lang="en-US" sz="2400" spc="-1" strike="noStrike">
+                <a:latin typeface="Arial"/>
+              </a:rPr>
+              <a:t> - when you register a client, you must tell the Authorization Server where to "</a:t>
+            </a:r>
+            <a:r>
+              <a:rPr b="0" i="1" lang="en-US" sz="2400" spc="-1" strike="noStrike">
+                <a:solidFill>
+                  <a:srgbClr val="000080"/>
+                </a:solidFill>
+                <a:latin typeface="Arial"/>
+              </a:rPr>
+              <a:t>redirect</a:t>
+            </a:r>
+            <a:r>
+              <a:rPr b="0" lang="en-US" sz="2400" spc="-1" strike="noStrike">
+                <a:latin typeface="Arial"/>
+              </a:rPr>
+              <a:t>" users after they grant (or deny) access to their resources.</a:t>
+            </a:r>
+            <a:endParaRPr b="0" lang="en-US" sz="2400" spc="-1" strike="noStrike">
+              <a:latin typeface="Arial"/>
+            </a:endParaRPr>
+          </a:p>
+          <a:p>
+            <a:r>
+              <a:rPr b="0" lang="en-US" sz="2400" spc="-1" strike="noStrike">
+                <a:solidFill>
+                  <a:srgbClr val="000080"/>
+                </a:solidFill>
+                <a:latin typeface="Arial"/>
+              </a:rPr>
+              <a:t>Authorization code</a:t>
+            </a:r>
+            <a:r>
+              <a:rPr b="0" lang="en-US" sz="2400" spc="-1" strike="noStrike">
+                <a:latin typeface="Arial"/>
+              </a:rPr>
+              <a:t> - a random value assigned by the Authorization Server.  The Client can use this code only once to get an "Access Token"</a:t>
+            </a:r>
+            <a:endParaRPr b="0" lang="en-US" sz="2400" spc="-1" strike="noStrike">
+              <a:latin typeface="Arial"/>
+            </a:endParaRPr>
+          </a:p>
+        </p:txBody>
+      </p:sp>
     </p:spTree>
   </p:cSld>
   <mc:AlternateContent>
@@ -6727,7 +7103,7 @@
       </p:grpSpPr>
       <p:pic>
         <p:nvPicPr>
-          <p:cNvPr id="147" name="" descr=""/>
+          <p:cNvPr id="148" name="" descr=""/>
           <p:cNvPicPr/>
           <p:nvPr/>
         </p:nvPicPr>
@@ -6737,8 +7113,8 @@
         </p:blipFill>
         <p:spPr>
           <a:xfrm>
-            <a:off x="1558800" y="0"/>
-            <a:ext cx="6072120" cy="6857640"/>
+            <a:off x="1097280" y="510120"/>
+            <a:ext cx="6757200" cy="6165000"/>
           </a:xfrm>
           <a:prstGeom prst="rect">
             <a:avLst/>
@@ -6787,7 +7163,7 @@
       </p:grpSpPr>
       <p:pic>
         <p:nvPicPr>
-          <p:cNvPr id="148" name="" descr=""/>
+          <p:cNvPr id="149" name="" descr=""/>
           <p:cNvPicPr/>
           <p:nvPr/>
         </p:nvPicPr>
@@ -6797,8 +7173,8 @@
         </p:blipFill>
         <p:spPr>
           <a:xfrm>
-            <a:off x="0" y="822240"/>
-            <a:ext cx="9164160" cy="5125680"/>
+            <a:off x="1558800" y="0"/>
+            <a:ext cx="6071760" cy="6857280"/>
           </a:xfrm>
           <a:prstGeom prst="rect">
             <a:avLst/>
@@ -6847,7 +7223,7 @@
       </p:grpSpPr>
       <p:pic>
         <p:nvPicPr>
-          <p:cNvPr id="149" name="" descr=""/>
+          <p:cNvPr id="150" name="" descr=""/>
           <p:cNvPicPr/>
           <p:nvPr/>
         </p:nvPicPr>
@@ -6857,31 +7233,8 @@
         </p:blipFill>
         <p:spPr>
           <a:xfrm>
-            <a:off x="5029200" y="1006560"/>
-            <a:ext cx="3714480" cy="2514240"/>
-          </a:xfrm>
-          <a:prstGeom prst="rect">
-            <a:avLst/>
-          </a:prstGeom>
-          <a:ln>
-            <a:noFill/>
-          </a:ln>
-        </p:spPr>
-      </p:pic>
-      <p:pic>
-        <p:nvPicPr>
-          <p:cNvPr id="150" name="" descr=""/>
-          <p:cNvPicPr/>
-          <p:nvPr/>
-        </p:nvPicPr>
-        <p:blipFill>
-          <a:blip r:embed="rId2"/>
-          <a:stretch/>
-        </p:blipFill>
-        <p:spPr>
-          <a:xfrm>
-            <a:off x="227160" y="512640"/>
-            <a:ext cx="4161960" cy="3419280"/>
+            <a:off x="0" y="822240"/>
+            <a:ext cx="9163800" cy="5125320"/>
           </a:xfrm>
           <a:prstGeom prst="rect">
             <a:avLst/>
@@ -6940,8 +7293,31 @@
         </p:blipFill>
         <p:spPr>
           <a:xfrm>
-            <a:off x="409680" y="2103480"/>
-            <a:ext cx="8276760" cy="1875960"/>
+            <a:off x="5029200" y="1006560"/>
+            <a:ext cx="3714120" cy="2513880"/>
+          </a:xfrm>
+          <a:prstGeom prst="rect">
+            <a:avLst/>
+          </a:prstGeom>
+          <a:ln>
+            <a:noFill/>
+          </a:ln>
+        </p:spPr>
+      </p:pic>
+      <p:pic>
+        <p:nvPicPr>
+          <p:cNvPr id="152" name="" descr=""/>
+          <p:cNvPicPr/>
+          <p:nvPr/>
+        </p:nvPicPr>
+        <p:blipFill>
+          <a:blip r:embed="rId2"/>
+          <a:stretch/>
+        </p:blipFill>
+        <p:spPr>
+          <a:xfrm>
+            <a:off x="227160" y="512640"/>
+            <a:ext cx="4161600" cy="3418920"/>
           </a:xfrm>
           <a:prstGeom prst="rect">
             <a:avLst/>
@@ -6990,7 +7366,7 @@
       </p:grpSpPr>
       <p:pic>
         <p:nvPicPr>
-          <p:cNvPr id="152" name="" descr=""/>
+          <p:cNvPr id="153" name="" descr=""/>
           <p:cNvPicPr/>
           <p:nvPr/>
         </p:nvPicPr>
@@ -7000,31 +7376,8 @@
         </p:blipFill>
         <p:spPr>
           <a:xfrm>
-            <a:off x="274680" y="457200"/>
-            <a:ext cx="8295840" cy="1638000"/>
-          </a:xfrm>
-          <a:prstGeom prst="rect">
-            <a:avLst/>
-          </a:prstGeom>
-          <a:ln>
-            <a:noFill/>
-          </a:ln>
-        </p:spPr>
-      </p:pic>
-      <p:pic>
-        <p:nvPicPr>
-          <p:cNvPr id="153" name="" descr=""/>
-          <p:cNvPicPr/>
-          <p:nvPr/>
-        </p:nvPicPr>
-        <p:blipFill>
-          <a:blip r:embed="rId2"/>
-          <a:stretch/>
-        </p:blipFill>
-        <p:spPr>
-          <a:xfrm>
-            <a:off x="182520" y="2109960"/>
-            <a:ext cx="8581680" cy="4657320"/>
+            <a:off x="409680" y="2103480"/>
+            <a:ext cx="8276400" cy="1875600"/>
           </a:xfrm>
           <a:prstGeom prst="rect">
             <a:avLst/>

</xml_diff>